<commit_message>
rewrite of noise section
</commit_message>
<xml_diff>
--- a/editing_images/load_calc_MCP.pptx
+++ b/editing_images/load_calc_MCP.pptx
@@ -299,7 +299,7 @@
           <a:p>
             <a:fld id="{DA1758D5-137F-4DB5-9D29-8DD7A04F891C}" type="datetimeFigureOut">
               <a:rPr lang="en-US" smtClean="0"/>
-              <a:t>5/8/2018</a:t>
+              <a:t>5/17/2018</a:t>
             </a:fld>
             <a:endParaRPr lang="en-US"/>
           </a:p>
@@ -469,7 +469,7 @@
           <a:p>
             <a:fld id="{DA1758D5-137F-4DB5-9D29-8DD7A04F891C}" type="datetimeFigureOut">
               <a:rPr lang="en-US" smtClean="0"/>
-              <a:t>5/8/2018</a:t>
+              <a:t>5/17/2018</a:t>
             </a:fld>
             <a:endParaRPr lang="en-US"/>
           </a:p>
@@ -649,7 +649,7 @@
           <a:p>
             <a:fld id="{DA1758D5-137F-4DB5-9D29-8DD7A04F891C}" type="datetimeFigureOut">
               <a:rPr lang="en-US" smtClean="0"/>
-              <a:t>5/8/2018</a:t>
+              <a:t>5/17/2018</a:t>
             </a:fld>
             <a:endParaRPr lang="en-US"/>
           </a:p>
@@ -819,7 +819,7 @@
           <a:p>
             <a:fld id="{DA1758D5-137F-4DB5-9D29-8DD7A04F891C}" type="datetimeFigureOut">
               <a:rPr lang="en-US" smtClean="0"/>
-              <a:t>5/8/2018</a:t>
+              <a:t>5/17/2018</a:t>
             </a:fld>
             <a:endParaRPr lang="en-US"/>
           </a:p>
@@ -1065,7 +1065,7 @@
           <a:p>
             <a:fld id="{DA1758D5-137F-4DB5-9D29-8DD7A04F891C}" type="datetimeFigureOut">
               <a:rPr lang="en-US" smtClean="0"/>
-              <a:t>5/8/2018</a:t>
+              <a:t>5/17/2018</a:t>
             </a:fld>
             <a:endParaRPr lang="en-US"/>
           </a:p>
@@ -1353,7 +1353,7 @@
           <a:p>
             <a:fld id="{DA1758D5-137F-4DB5-9D29-8DD7A04F891C}" type="datetimeFigureOut">
               <a:rPr lang="en-US" smtClean="0"/>
-              <a:t>5/8/2018</a:t>
+              <a:t>5/17/2018</a:t>
             </a:fld>
             <a:endParaRPr lang="en-US"/>
           </a:p>
@@ -1775,7 +1775,7 @@
           <a:p>
             <a:fld id="{DA1758D5-137F-4DB5-9D29-8DD7A04F891C}" type="datetimeFigureOut">
               <a:rPr lang="en-US" smtClean="0"/>
-              <a:t>5/8/2018</a:t>
+              <a:t>5/17/2018</a:t>
             </a:fld>
             <a:endParaRPr lang="en-US"/>
           </a:p>
@@ -1893,7 +1893,7 @@
           <a:p>
             <a:fld id="{DA1758D5-137F-4DB5-9D29-8DD7A04F891C}" type="datetimeFigureOut">
               <a:rPr lang="en-US" smtClean="0"/>
-              <a:t>5/8/2018</a:t>
+              <a:t>5/17/2018</a:t>
             </a:fld>
             <a:endParaRPr lang="en-US"/>
           </a:p>
@@ -1988,7 +1988,7 @@
           <a:p>
             <a:fld id="{DA1758D5-137F-4DB5-9D29-8DD7A04F891C}" type="datetimeFigureOut">
               <a:rPr lang="en-US" smtClean="0"/>
-              <a:t>5/8/2018</a:t>
+              <a:t>5/17/2018</a:t>
             </a:fld>
             <a:endParaRPr lang="en-US"/>
           </a:p>
@@ -2265,7 +2265,7 @@
           <a:p>
             <a:fld id="{DA1758D5-137F-4DB5-9D29-8DD7A04F891C}" type="datetimeFigureOut">
               <a:rPr lang="en-US" smtClean="0"/>
-              <a:t>5/8/2018</a:t>
+              <a:t>5/17/2018</a:t>
             </a:fld>
             <a:endParaRPr lang="en-US"/>
           </a:p>
@@ -2518,7 +2518,7 @@
           <a:p>
             <a:fld id="{DA1758D5-137F-4DB5-9D29-8DD7A04F891C}" type="datetimeFigureOut">
               <a:rPr lang="en-US" smtClean="0"/>
-              <a:t>5/8/2018</a:t>
+              <a:t>5/17/2018</a:t>
             </a:fld>
             <a:endParaRPr lang="en-US"/>
           </a:p>
@@ -2731,7 +2731,7 @@
           <a:p>
             <a:fld id="{DA1758D5-137F-4DB5-9D29-8DD7A04F891C}" type="datetimeFigureOut">
               <a:rPr lang="en-US" smtClean="0"/>
-              <a:t>5/8/2018</a:t>
+              <a:t>5/17/2018</a:t>
             </a:fld>
             <a:endParaRPr lang="en-US"/>
           </a:p>
@@ -3114,10 +3114,10 @@
         </p:nvGrpSpPr>
         <p:grpSpPr>
           <a:xfrm>
-            <a:off x="526501" y="1165350"/>
-            <a:ext cx="7051850" cy="2669372"/>
-            <a:chOff x="526501" y="1165350"/>
-            <a:chExt cx="7051850" cy="2669372"/>
+            <a:off x="599090" y="1189640"/>
+            <a:ext cx="8011509" cy="2448910"/>
+            <a:chOff x="589822" y="1189640"/>
+            <a:chExt cx="6988529" cy="2448910"/>
           </a:xfrm>
         </p:grpSpPr>
         <p:sp>
@@ -3179,8 +3179,8 @@
           </p:nvSpPr>
           <p:spPr>
             <a:xfrm>
-              <a:off x="3962400" y="1814850"/>
-              <a:ext cx="108000" cy="1595100"/>
+              <a:off x="3922496" y="2013189"/>
+              <a:ext cx="65341" cy="1198423"/>
             </a:xfrm>
             <a:prstGeom prst="ellipse">
               <a:avLst/>
@@ -3222,7 +3222,7 @@
           </p:nvSpPr>
           <p:spPr>
             <a:xfrm rot="119318">
-              <a:off x="5370373" y="2421592"/>
+              <a:off x="5390291" y="2421592"/>
               <a:ext cx="345808" cy="367116"/>
             </a:xfrm>
             <a:prstGeom prst="chord">
@@ -3268,8 +3268,8 @@
           </p:nvSpPr>
           <p:spPr>
             <a:xfrm>
-              <a:off x="3200399" y="1550826"/>
-              <a:ext cx="2374279" cy="2087724"/>
+              <a:off x="2971799" y="1550826"/>
+              <a:ext cx="2602880" cy="2087724"/>
             </a:xfrm>
             <a:prstGeom prst="rect">
               <a:avLst/>
@@ -3309,7 +3309,7 @@
           </p:nvSpPr>
           <p:spPr>
             <a:xfrm>
-              <a:off x="3080700" y="2298450"/>
+              <a:off x="2792504" y="2298450"/>
               <a:ext cx="348300" cy="578100"/>
             </a:xfrm>
             <a:prstGeom prst="rect">
@@ -3352,8 +3352,8 @@
           </p:nvCxnSpPr>
           <p:spPr>
             <a:xfrm flipH="1" flipV="1">
-              <a:off x="3224213" y="2190750"/>
-              <a:ext cx="2139896" cy="320696"/>
+              <a:off x="2973577" y="2144110"/>
+              <a:ext cx="2390532" cy="367336"/>
             </a:xfrm>
             <a:prstGeom prst="straightConnector1">
               <a:avLst/>
@@ -3380,8 +3380,8 @@
           </p:nvCxnSpPr>
           <p:spPr>
             <a:xfrm flipH="1">
-              <a:off x="3209925" y="2713071"/>
-              <a:ext cx="2154185" cy="292067"/>
+              <a:off x="2982746" y="2713071"/>
+              <a:ext cx="2381363" cy="334929"/>
             </a:xfrm>
             <a:prstGeom prst="straightConnector1">
               <a:avLst/>
@@ -3408,8 +3408,8 @@
           </p:nvCxnSpPr>
           <p:spPr>
             <a:xfrm flipH="1" flipV="1">
-              <a:off x="3233738" y="2005013"/>
-              <a:ext cx="2138362" cy="490538"/>
+              <a:off x="2982746" y="1954924"/>
+              <a:ext cx="2389355" cy="540627"/>
             </a:xfrm>
             <a:prstGeom prst="straightConnector1">
               <a:avLst/>
@@ -3434,8 +3434,8 @@
           </p:nvCxnSpPr>
           <p:spPr>
             <a:xfrm flipH="1">
-              <a:off x="3219450" y="2724150"/>
-              <a:ext cx="2162176" cy="471488"/>
+              <a:off x="2982746" y="2724150"/>
+              <a:ext cx="2398881" cy="534057"/>
             </a:xfrm>
             <a:prstGeom prst="straightConnector1">
               <a:avLst/>
@@ -3460,7 +3460,7 @@
           </p:nvSpPr>
           <p:spPr>
             <a:xfrm>
-              <a:off x="3186112" y="1574780"/>
+              <a:off x="2489951" y="1394590"/>
               <a:ext cx="766200" cy="563724"/>
             </a:xfrm>
             <a:prstGeom prst="rect">
@@ -3515,8 +3515,8 @@
           </p:nvSpPr>
           <p:spPr>
             <a:xfrm>
-              <a:off x="3163267" y="3282418"/>
-              <a:ext cx="2627933" cy="552304"/>
+              <a:off x="2956315" y="3282418"/>
+              <a:ext cx="2627933" cy="356132"/>
             </a:xfrm>
             <a:prstGeom prst="rect">
               <a:avLst/>
@@ -3532,7 +3532,7 @@
             </a:bodyPr>
             <a:lstStyle/>
             <a:p>
-              <a:pPr marL="0" lvl="0" indent="0">
+              <a:pPr marL="0" lvl="0" indent="0" algn="ctr">
                 <a:spcBef>
                   <a:spcPts val="0"/>
                 </a:spcBef>
@@ -3544,7 +3544,11 @@
               </a:r>
               <a:r>
                 <a:rPr lang="en" dirty="0" smtClean="0"/>
-                <a:t>stop and optics box </a:t>
+                <a:t>stop and optics </a:t>
+              </a:r>
+              <a:r>
+                <a:rPr lang="en" dirty="0" smtClean="0"/>
+                <a:t>box 6 K </a:t>
               </a:r>
               <a:endParaRPr lang="en" dirty="0"/>
             </a:p>
@@ -3608,8 +3612,8 @@
           </p:nvSpPr>
           <p:spPr>
             <a:xfrm>
-              <a:off x="2054669" y="1804344"/>
-              <a:ext cx="108000" cy="1595100"/>
+              <a:off x="2068097" y="1847409"/>
+              <a:ext cx="81142" cy="1508970"/>
             </a:xfrm>
             <a:prstGeom prst="ellipse">
               <a:avLst/>
@@ -3651,8 +3655,8 @@
           </p:nvSpPr>
           <p:spPr>
             <a:xfrm>
-              <a:off x="1563069" y="1287426"/>
-              <a:ext cx="1561131" cy="263400"/>
+              <a:off x="1364313" y="1189640"/>
+              <a:ext cx="1561131" cy="509687"/>
             </a:xfrm>
             <a:prstGeom prst="rect">
               <a:avLst/>
@@ -3668,7 +3672,7 @@
             </a:bodyPr>
             <a:lstStyle/>
             <a:p>
-              <a:pPr marL="0" lvl="0" indent="0" rtl="0">
+              <a:pPr marL="0" lvl="0" indent="0" algn="ctr" rtl="0">
                 <a:spcBef>
                   <a:spcPts val="0"/>
                 </a:spcBef>
@@ -3676,7 +3680,11 @@
               </a:pPr>
               <a:r>
                 <a:rPr lang="en" dirty="0" smtClean="0"/>
-                <a:t>Primary mirror</a:t>
+                <a:t>Primary </a:t>
+              </a:r>
+              <a:r>
+                <a:rPr lang="en" dirty="0" smtClean="0"/>
+                <a:t>mirror 15 K</a:t>
               </a:r>
               <a:endParaRPr lang="en" dirty="0"/>
             </a:p>
@@ -3717,8 +3725,8 @@
           </p:nvSpPr>
           <p:spPr>
             <a:xfrm>
-              <a:off x="526501" y="1298413"/>
-              <a:ext cx="1385400" cy="263400"/>
+              <a:off x="589822" y="1380019"/>
+              <a:ext cx="553741" cy="505931"/>
             </a:xfrm>
             <a:prstGeom prst="rect">
               <a:avLst/>
@@ -3734,7 +3742,7 @@
             </a:bodyPr>
             <a:lstStyle/>
             <a:p>
-              <a:pPr marL="0" lvl="0" indent="0" rtl="0">
+              <a:pPr marL="0" lvl="0" indent="0" algn="ctr" rtl="0">
                 <a:spcBef>
                   <a:spcPts val="0"/>
                 </a:spcBef>
@@ -3859,8 +3867,8 @@
           </p:nvCxnSpPr>
           <p:spPr>
             <a:xfrm flipH="1" flipV="1">
-              <a:off x="3133725" y="2347913"/>
-              <a:ext cx="2224091" cy="163535"/>
+              <a:off x="2900232" y="2333297"/>
+              <a:ext cx="2457585" cy="178152"/>
             </a:xfrm>
             <a:prstGeom prst="straightConnector1">
               <a:avLst/>
@@ -3885,8 +3893,8 @@
           </p:nvCxnSpPr>
           <p:spPr>
             <a:xfrm flipH="1">
-              <a:off x="3095625" y="2713073"/>
-              <a:ext cx="2262193" cy="101565"/>
+              <a:off x="2891063" y="2713073"/>
+              <a:ext cx="2466756" cy="124720"/>
             </a:xfrm>
             <a:prstGeom prst="straightConnector1">
               <a:avLst/>
@@ -3911,7 +3919,7 @@
           </p:nvSpPr>
           <p:spPr>
             <a:xfrm>
-              <a:off x="2588699" y="1850376"/>
+              <a:off x="2491595" y="1809750"/>
               <a:ext cx="766200" cy="563724"/>
             </a:xfrm>
             <a:prstGeom prst="rect">
@@ -3972,7 +3980,7 @@
           </p:nvSpPr>
           <p:spPr>
             <a:xfrm>
-              <a:off x="2588699" y="2545012"/>
+              <a:off x="2500763" y="2389026"/>
               <a:ext cx="766200" cy="563724"/>
             </a:xfrm>
             <a:prstGeom prst="rect">
@@ -4027,8 +4035,8 @@
           </p:nvSpPr>
           <p:spPr>
             <a:xfrm>
-              <a:off x="3289834" y="1183548"/>
-              <a:ext cx="1561131" cy="263400"/>
+              <a:off x="3159006" y="1189640"/>
+              <a:ext cx="1561131" cy="673094"/>
             </a:xfrm>
             <a:prstGeom prst="rect">
               <a:avLst/>
@@ -4052,7 +4060,11 @@
               </a:pPr>
               <a:r>
                 <a:rPr lang="en" dirty="0" smtClean="0"/>
-                <a:t>Secondary mirror</a:t>
+                <a:t>Secondary </a:t>
+              </a:r>
+              <a:r>
+                <a:rPr lang="en" dirty="0" smtClean="0"/>
+                <a:t>mirror 10 K</a:t>
               </a:r>
               <a:endParaRPr lang="en" dirty="0"/>
             </a:p>
@@ -4066,7 +4078,7 @@
           </p:nvSpPr>
           <p:spPr>
             <a:xfrm>
-              <a:off x="4401035" y="1165350"/>
+              <a:off x="4401035" y="1200150"/>
               <a:ext cx="1466366" cy="263400"/>
             </a:xfrm>
             <a:prstGeom prst="rect">
@@ -4091,7 +4103,11 @@
               </a:pPr>
               <a:r>
                 <a:rPr lang="en" dirty="0" smtClean="0"/>
-                <a:t>Low pass filter</a:t>
+                <a:t>Low pass </a:t>
+              </a:r>
+              <a:r>
+                <a:rPr lang="en" dirty="0" smtClean="0"/>
+                <a:t>filter 100 mK</a:t>
               </a:r>
               <a:endParaRPr lang="en" dirty="0"/>
             </a:p>

</xml_diff>

<commit_message>
figure and table tweaks.
</commit_message>
<xml_diff>
--- a/editing_images/load_calc_MCP.pptx
+++ b/editing_images/load_calc_MCP.pptx
@@ -299,7 +299,7 @@
           <a:p>
             <a:fld id="{DA1758D5-137F-4DB5-9D29-8DD7A04F891C}" type="datetimeFigureOut">
               <a:rPr lang="en-US" smtClean="0"/>
-              <a:t>5/17/2018</a:t>
+              <a:t>5/18/2018</a:t>
             </a:fld>
             <a:endParaRPr lang="en-US"/>
           </a:p>
@@ -469,7 +469,7 @@
           <a:p>
             <a:fld id="{DA1758D5-137F-4DB5-9D29-8DD7A04F891C}" type="datetimeFigureOut">
               <a:rPr lang="en-US" smtClean="0"/>
-              <a:t>5/17/2018</a:t>
+              <a:t>5/18/2018</a:t>
             </a:fld>
             <a:endParaRPr lang="en-US"/>
           </a:p>
@@ -649,7 +649,7 @@
           <a:p>
             <a:fld id="{DA1758D5-137F-4DB5-9D29-8DD7A04F891C}" type="datetimeFigureOut">
               <a:rPr lang="en-US" smtClean="0"/>
-              <a:t>5/17/2018</a:t>
+              <a:t>5/18/2018</a:t>
             </a:fld>
             <a:endParaRPr lang="en-US"/>
           </a:p>
@@ -819,7 +819,7 @@
           <a:p>
             <a:fld id="{DA1758D5-137F-4DB5-9D29-8DD7A04F891C}" type="datetimeFigureOut">
               <a:rPr lang="en-US" smtClean="0"/>
-              <a:t>5/17/2018</a:t>
+              <a:t>5/18/2018</a:t>
             </a:fld>
             <a:endParaRPr lang="en-US"/>
           </a:p>
@@ -1065,7 +1065,7 @@
           <a:p>
             <a:fld id="{DA1758D5-137F-4DB5-9D29-8DD7A04F891C}" type="datetimeFigureOut">
               <a:rPr lang="en-US" smtClean="0"/>
-              <a:t>5/17/2018</a:t>
+              <a:t>5/18/2018</a:t>
             </a:fld>
             <a:endParaRPr lang="en-US"/>
           </a:p>
@@ -1353,7 +1353,7 @@
           <a:p>
             <a:fld id="{DA1758D5-137F-4DB5-9D29-8DD7A04F891C}" type="datetimeFigureOut">
               <a:rPr lang="en-US" smtClean="0"/>
-              <a:t>5/17/2018</a:t>
+              <a:t>5/18/2018</a:t>
             </a:fld>
             <a:endParaRPr lang="en-US"/>
           </a:p>
@@ -1775,7 +1775,7 @@
           <a:p>
             <a:fld id="{DA1758D5-137F-4DB5-9D29-8DD7A04F891C}" type="datetimeFigureOut">
               <a:rPr lang="en-US" smtClean="0"/>
-              <a:t>5/17/2018</a:t>
+              <a:t>5/18/2018</a:t>
             </a:fld>
             <a:endParaRPr lang="en-US"/>
           </a:p>
@@ -1893,7 +1893,7 @@
           <a:p>
             <a:fld id="{DA1758D5-137F-4DB5-9D29-8DD7A04F891C}" type="datetimeFigureOut">
               <a:rPr lang="en-US" smtClean="0"/>
-              <a:t>5/17/2018</a:t>
+              <a:t>5/18/2018</a:t>
             </a:fld>
             <a:endParaRPr lang="en-US"/>
           </a:p>
@@ -1988,7 +1988,7 @@
           <a:p>
             <a:fld id="{DA1758D5-137F-4DB5-9D29-8DD7A04F891C}" type="datetimeFigureOut">
               <a:rPr lang="en-US" smtClean="0"/>
-              <a:t>5/17/2018</a:t>
+              <a:t>5/18/2018</a:t>
             </a:fld>
             <a:endParaRPr lang="en-US"/>
           </a:p>
@@ -2265,7 +2265,7 @@
           <a:p>
             <a:fld id="{DA1758D5-137F-4DB5-9D29-8DD7A04F891C}" type="datetimeFigureOut">
               <a:rPr lang="en-US" smtClean="0"/>
-              <a:t>5/17/2018</a:t>
+              <a:t>5/18/2018</a:t>
             </a:fld>
             <a:endParaRPr lang="en-US"/>
           </a:p>
@@ -2518,7 +2518,7 @@
           <a:p>
             <a:fld id="{DA1758D5-137F-4DB5-9D29-8DD7A04F891C}" type="datetimeFigureOut">
               <a:rPr lang="en-US" smtClean="0"/>
-              <a:t>5/17/2018</a:t>
+              <a:t>5/18/2018</a:t>
             </a:fld>
             <a:endParaRPr lang="en-US"/>
           </a:p>
@@ -2731,7 +2731,7 @@
           <a:p>
             <a:fld id="{DA1758D5-137F-4DB5-9D29-8DD7A04F891C}" type="datetimeFigureOut">
               <a:rPr lang="en-US" smtClean="0"/>
-              <a:t>5/17/2018</a:t>
+              <a:t>5/18/2018</a:t>
             </a:fld>
             <a:endParaRPr lang="en-US"/>
           </a:p>
@@ -3544,11 +3544,7 @@
               </a:r>
               <a:r>
                 <a:rPr lang="en" dirty="0" smtClean="0"/>
-                <a:t>stop and optics </a:t>
-              </a:r>
-              <a:r>
-                <a:rPr lang="en" dirty="0" smtClean="0"/>
-                <a:t>box 6 K </a:t>
+                <a:t>stop and optics box 6 K </a:t>
               </a:r>
               <a:endParaRPr lang="en" dirty="0"/>
             </a:p>
@@ -3680,11 +3676,7 @@
               </a:pPr>
               <a:r>
                 <a:rPr lang="en" dirty="0" smtClean="0"/>
-                <a:t>Primary </a:t>
-              </a:r>
-              <a:r>
-                <a:rPr lang="en" dirty="0" smtClean="0"/>
-                <a:t>mirror 15 K</a:t>
+                <a:t>Primary mirror 15 K</a:t>
               </a:r>
               <a:endParaRPr lang="en" dirty="0"/>
             </a:p>
@@ -3815,8 +3807,8 @@
           </p:nvCxnSpPr>
           <p:spPr>
             <a:xfrm>
-              <a:off x="3285226" y="2156246"/>
-              <a:ext cx="457200" cy="0"/>
+              <a:off x="2991914" y="2138200"/>
+              <a:ext cx="553214" cy="0"/>
             </a:xfrm>
             <a:prstGeom prst="straightConnector1">
               <a:avLst/>
@@ -4060,11 +4052,7 @@
               </a:pPr>
               <a:r>
                 <a:rPr lang="en" dirty="0" smtClean="0"/>
-                <a:t>Secondary </a:t>
-              </a:r>
-              <a:r>
-                <a:rPr lang="en" dirty="0" smtClean="0"/>
-                <a:t>mirror 10 K</a:t>
+                <a:t>Secondary mirror 10 K</a:t>
               </a:r>
               <a:endParaRPr lang="en" dirty="0"/>
             </a:p>
@@ -4103,11 +4091,7 @@
               </a:pPr>
               <a:r>
                 <a:rPr lang="en" dirty="0" smtClean="0"/>
-                <a:t>Low pass </a:t>
-              </a:r>
-              <a:r>
-                <a:rPr lang="en" dirty="0" smtClean="0"/>
-                <a:t>filter 100 mK</a:t>
+                <a:t>Low pass filter 100 mK</a:t>
               </a:r>
               <a:endParaRPr lang="en" dirty="0"/>
             </a:p>

</xml_diff>